<commit_message>
typos corrected in week 12
</commit_message>
<xml_diff>
--- a/Lectures2024/CITS5503APIGateway_week12.pptx
+++ b/Lectures2024/CITS5503APIGateway_week12.pptx
@@ -284,6 +284,215 @@
 <file path=ppt/changesInfos/changesInfo1.xml><?xml version="1.0" encoding="utf-8"?>
 <pc:chgInfo xmlns:a="http://schemas.openxmlformats.org/drawingml/2006/main" xmlns:r="http://schemas.openxmlformats.org/officeDocument/2006/relationships" xmlns:ac="http://schemas.microsoft.com/office/drawing/2013/main/command" xmlns:pc="http://schemas.microsoft.com/office/powerpoint/2013/main/command">
   <pc:docChgLst>
+    <pc:chgData name="张 智" userId="36bdf691fd3510be" providerId="LiveId" clId="{4ACBCBA1-ED6D-491C-9148-AF0EE5CDBC60}"/>
+    <pc:docChg chg="custSel modSld">
+      <pc:chgData name="张 智" userId="36bdf691fd3510be" providerId="LiveId" clId="{4ACBCBA1-ED6D-491C-9148-AF0EE5CDBC60}" dt="2024-10-15T03:57:32.200" v="449"/>
+      <pc:docMkLst>
+        <pc:docMk/>
+      </pc:docMkLst>
+      <pc:sldChg chg="modNotes">
+        <pc:chgData name="张 智" userId="36bdf691fd3510be" providerId="LiveId" clId="{4ACBCBA1-ED6D-491C-9148-AF0EE5CDBC60}" dt="2024-10-15T03:35:10.292" v="128" actId="27636"/>
+        <pc:sldMkLst>
+          <pc:docMk/>
+          <pc:sldMk cId="1394811616" sldId="1538"/>
+        </pc:sldMkLst>
+      </pc:sldChg>
+      <pc:sldChg chg="modNotesTx">
+        <pc:chgData name="张 智" userId="36bdf691fd3510be" providerId="LiveId" clId="{4ACBCBA1-ED6D-491C-9148-AF0EE5CDBC60}" dt="2024-10-15T03:35:26.192" v="140" actId="20577"/>
+        <pc:sldMkLst>
+          <pc:docMk/>
+          <pc:sldMk cId="2913647046" sldId="1577"/>
+        </pc:sldMkLst>
+      </pc:sldChg>
+      <pc:sldChg chg="modNotesTx">
+        <pc:chgData name="张 智" userId="36bdf691fd3510be" providerId="LiveId" clId="{4ACBCBA1-ED6D-491C-9148-AF0EE5CDBC60}" dt="2024-10-15T03:35:57.020" v="148" actId="20577"/>
+        <pc:sldMkLst>
+          <pc:docMk/>
+          <pc:sldMk cId="1276195465" sldId="1585"/>
+        </pc:sldMkLst>
+      </pc:sldChg>
+      <pc:sldChg chg="modNotesTx">
+        <pc:chgData name="张 智" userId="36bdf691fd3510be" providerId="LiveId" clId="{4ACBCBA1-ED6D-491C-9148-AF0EE5CDBC60}" dt="2024-10-15T03:44:00.524" v="378" actId="20577"/>
+        <pc:sldMkLst>
+          <pc:docMk/>
+          <pc:sldMk cId="1528803584" sldId="1586"/>
+        </pc:sldMkLst>
+      </pc:sldChg>
+      <pc:sldChg chg="modNotesTx">
+        <pc:chgData name="张 智" userId="36bdf691fd3510be" providerId="LiveId" clId="{4ACBCBA1-ED6D-491C-9148-AF0EE5CDBC60}" dt="2024-10-15T03:38:28.649" v="212" actId="20577"/>
+        <pc:sldMkLst>
+          <pc:docMk/>
+          <pc:sldMk cId="1995856159" sldId="1587"/>
+        </pc:sldMkLst>
+      </pc:sldChg>
+      <pc:sldChg chg="modSp mod modNotesTx">
+        <pc:chgData name="张 智" userId="36bdf691fd3510be" providerId="LiveId" clId="{4ACBCBA1-ED6D-491C-9148-AF0EE5CDBC60}" dt="2024-10-15T03:48:07.044" v="388" actId="20577"/>
+        <pc:sldMkLst>
+          <pc:docMk/>
+          <pc:sldMk cId="748938126" sldId="1594"/>
+        </pc:sldMkLst>
+        <pc:spChg chg="mod">
+          <ac:chgData name="张 智" userId="36bdf691fd3510be" providerId="LiveId" clId="{4ACBCBA1-ED6D-491C-9148-AF0EE5CDBC60}" dt="2024-10-15T03:48:07.044" v="388" actId="20577"/>
+          <ac:spMkLst>
+            <pc:docMk/>
+            <pc:sldMk cId="748938126" sldId="1594"/>
+            <ac:spMk id="8" creationId="{55B6B504-F562-4798-A6F4-2634DD72903A}"/>
+          </ac:spMkLst>
+        </pc:spChg>
+      </pc:sldChg>
+      <pc:sldChg chg="modSp mod">
+        <pc:chgData name="张 智" userId="36bdf691fd3510be" providerId="LiveId" clId="{4ACBCBA1-ED6D-491C-9148-AF0EE5CDBC60}" dt="2024-10-15T03:56:15.384" v="437" actId="20577"/>
+        <pc:sldMkLst>
+          <pc:docMk/>
+          <pc:sldMk cId="2216360164" sldId="1596"/>
+        </pc:sldMkLst>
+        <pc:spChg chg="mod">
+          <ac:chgData name="张 智" userId="36bdf691fd3510be" providerId="LiveId" clId="{4ACBCBA1-ED6D-491C-9148-AF0EE5CDBC60}" dt="2024-10-15T03:56:15.384" v="437" actId="20577"/>
+          <ac:spMkLst>
+            <pc:docMk/>
+            <pc:sldMk cId="2216360164" sldId="1596"/>
+            <ac:spMk id="8" creationId="{55B6B504-F562-4798-A6F4-2634DD72903A}"/>
+          </ac:spMkLst>
+        </pc:spChg>
+      </pc:sldChg>
+      <pc:sldChg chg="modSp mod modNotesTx">
+        <pc:chgData name="张 智" userId="36bdf691fd3510be" providerId="LiveId" clId="{4ACBCBA1-ED6D-491C-9148-AF0EE5CDBC60}" dt="2024-10-15T03:56:09.803" v="436" actId="20577"/>
+        <pc:sldMkLst>
+          <pc:docMk/>
+          <pc:sldMk cId="2623868558" sldId="1600"/>
+        </pc:sldMkLst>
+        <pc:spChg chg="mod">
+          <ac:chgData name="张 智" userId="36bdf691fd3510be" providerId="LiveId" clId="{4ACBCBA1-ED6D-491C-9148-AF0EE5CDBC60}" dt="2024-10-15T03:56:09.803" v="436" actId="20577"/>
+          <ac:spMkLst>
+            <pc:docMk/>
+            <pc:sldMk cId="2623868558" sldId="1600"/>
+            <ac:spMk id="8" creationId="{55B6B504-F562-4798-A6F4-2634DD72903A}"/>
+          </ac:spMkLst>
+        </pc:spChg>
+      </pc:sldChg>
+      <pc:sldChg chg="modSp mod">
+        <pc:chgData name="张 智" userId="36bdf691fd3510be" providerId="LiveId" clId="{4ACBCBA1-ED6D-491C-9148-AF0EE5CDBC60}" dt="2024-10-15T03:56:04.706" v="435" actId="20577"/>
+        <pc:sldMkLst>
+          <pc:docMk/>
+          <pc:sldMk cId="1537833119" sldId="1601"/>
+        </pc:sldMkLst>
+        <pc:spChg chg="mod">
+          <ac:chgData name="张 智" userId="36bdf691fd3510be" providerId="LiveId" clId="{4ACBCBA1-ED6D-491C-9148-AF0EE5CDBC60}" dt="2024-10-15T03:56:04.706" v="435" actId="20577"/>
+          <ac:spMkLst>
+            <pc:docMk/>
+            <pc:sldMk cId="1537833119" sldId="1601"/>
+            <ac:spMk id="8" creationId="{55B6B504-F562-4798-A6F4-2634DD72903A}"/>
+          </ac:spMkLst>
+        </pc:spChg>
+      </pc:sldChg>
+      <pc:sldChg chg="modSp mod">
+        <pc:chgData name="张 智" userId="36bdf691fd3510be" providerId="LiveId" clId="{4ACBCBA1-ED6D-491C-9148-AF0EE5CDBC60}" dt="2024-10-15T03:55:59.421" v="434" actId="20577"/>
+        <pc:sldMkLst>
+          <pc:docMk/>
+          <pc:sldMk cId="1578754177" sldId="1602"/>
+        </pc:sldMkLst>
+        <pc:spChg chg="mod">
+          <ac:chgData name="张 智" userId="36bdf691fd3510be" providerId="LiveId" clId="{4ACBCBA1-ED6D-491C-9148-AF0EE5CDBC60}" dt="2024-10-15T03:55:59.421" v="434" actId="20577"/>
+          <ac:spMkLst>
+            <pc:docMk/>
+            <pc:sldMk cId="1578754177" sldId="1602"/>
+            <ac:spMk id="8" creationId="{55B6B504-F562-4798-A6F4-2634DD72903A}"/>
+          </ac:spMkLst>
+        </pc:spChg>
+      </pc:sldChg>
+      <pc:sldChg chg="modSp mod">
+        <pc:chgData name="张 智" userId="36bdf691fd3510be" providerId="LiveId" clId="{4ACBCBA1-ED6D-491C-9148-AF0EE5CDBC60}" dt="2024-10-15T03:55:53.904" v="433" actId="20577"/>
+        <pc:sldMkLst>
+          <pc:docMk/>
+          <pc:sldMk cId="2410171162" sldId="1603"/>
+        </pc:sldMkLst>
+        <pc:spChg chg="mod">
+          <ac:chgData name="张 智" userId="36bdf691fd3510be" providerId="LiveId" clId="{4ACBCBA1-ED6D-491C-9148-AF0EE5CDBC60}" dt="2024-10-15T03:55:53.904" v="433" actId="20577"/>
+          <ac:spMkLst>
+            <pc:docMk/>
+            <pc:sldMk cId="2410171162" sldId="1603"/>
+            <ac:spMk id="8" creationId="{55B6B504-F562-4798-A6F4-2634DD72903A}"/>
+          </ac:spMkLst>
+        </pc:spChg>
+      </pc:sldChg>
+      <pc:sldChg chg="modSp mod">
+        <pc:chgData name="张 智" userId="36bdf691fd3510be" providerId="LiveId" clId="{4ACBCBA1-ED6D-491C-9148-AF0EE5CDBC60}" dt="2024-10-15T03:57:08.815" v="444" actId="20577"/>
+        <pc:sldMkLst>
+          <pc:docMk/>
+          <pc:sldMk cId="316065154" sldId="1604"/>
+        </pc:sldMkLst>
+        <pc:spChg chg="mod">
+          <ac:chgData name="张 智" userId="36bdf691fd3510be" providerId="LiveId" clId="{4ACBCBA1-ED6D-491C-9148-AF0EE5CDBC60}" dt="2024-10-15T03:57:08.815" v="444" actId="20577"/>
+          <ac:spMkLst>
+            <pc:docMk/>
+            <pc:sldMk cId="316065154" sldId="1604"/>
+            <ac:spMk id="8" creationId="{55B6B504-F562-4798-A6F4-2634DD72903A}"/>
+          </ac:spMkLst>
+        </pc:spChg>
+      </pc:sldChg>
+      <pc:sldChg chg="modSp mod">
+        <pc:chgData name="张 智" userId="36bdf691fd3510be" providerId="LiveId" clId="{4ACBCBA1-ED6D-491C-9148-AF0EE5CDBC60}" dt="2024-10-15T03:57:02.964" v="441" actId="20577"/>
+        <pc:sldMkLst>
+          <pc:docMk/>
+          <pc:sldMk cId="2971224565" sldId="1608"/>
+        </pc:sldMkLst>
+        <pc:spChg chg="mod">
+          <ac:chgData name="张 智" userId="36bdf691fd3510be" providerId="LiveId" clId="{4ACBCBA1-ED6D-491C-9148-AF0EE5CDBC60}" dt="2024-10-15T03:57:02.964" v="441" actId="20577"/>
+          <ac:spMkLst>
+            <pc:docMk/>
+            <pc:sldMk cId="2971224565" sldId="1608"/>
+            <ac:spMk id="8" creationId="{55B6B504-F562-4798-A6F4-2634DD72903A}"/>
+          </ac:spMkLst>
+        </pc:spChg>
+      </pc:sldChg>
+      <pc:sldChg chg="modSp mod">
+        <pc:chgData name="张 智" userId="36bdf691fd3510be" providerId="LiveId" clId="{4ACBCBA1-ED6D-491C-9148-AF0EE5CDBC60}" dt="2024-10-15T03:57:17.411" v="448" actId="20577"/>
+        <pc:sldMkLst>
+          <pc:docMk/>
+          <pc:sldMk cId="1282002246" sldId="1609"/>
+        </pc:sldMkLst>
+        <pc:spChg chg="mod">
+          <ac:chgData name="张 智" userId="36bdf691fd3510be" providerId="LiveId" clId="{4ACBCBA1-ED6D-491C-9148-AF0EE5CDBC60}" dt="2024-10-15T03:57:17.411" v="448" actId="20577"/>
+          <ac:spMkLst>
+            <pc:docMk/>
+            <pc:sldMk cId="1282002246" sldId="1609"/>
+            <ac:spMk id="8" creationId="{55B6B504-F562-4798-A6F4-2634DD72903A}"/>
+          </ac:spMkLst>
+        </pc:spChg>
+      </pc:sldChg>
+      <pc:sldChg chg="modSp mod">
+        <pc:chgData name="张 智" userId="36bdf691fd3510be" providerId="LiveId" clId="{4ACBCBA1-ED6D-491C-9148-AF0EE5CDBC60}" dt="2024-10-15T03:57:32.200" v="449"/>
+        <pc:sldMkLst>
+          <pc:docMk/>
+          <pc:sldMk cId="2519971011" sldId="1610"/>
+        </pc:sldMkLst>
+        <pc:spChg chg="mod">
+          <ac:chgData name="张 智" userId="36bdf691fd3510be" providerId="LiveId" clId="{4ACBCBA1-ED6D-491C-9148-AF0EE5CDBC60}" dt="2024-10-15T03:57:32.200" v="449"/>
+          <ac:spMkLst>
+            <pc:docMk/>
+            <pc:sldMk cId="2519971011" sldId="1610"/>
+            <ac:spMk id="8" creationId="{55B6B504-F562-4798-A6F4-2634DD72903A}"/>
+          </ac:spMkLst>
+        </pc:spChg>
+      </pc:sldChg>
+      <pc:sldChg chg="modSp mod modNotesTx">
+        <pc:chgData name="张 智" userId="36bdf691fd3510be" providerId="LiveId" clId="{4ACBCBA1-ED6D-491C-9148-AF0EE5CDBC60}" dt="2024-10-15T03:41:18.591" v="265" actId="20577"/>
+        <pc:sldMkLst>
+          <pc:docMk/>
+          <pc:sldMk cId="318857117" sldId="1615"/>
+        </pc:sldMkLst>
+        <pc:spChg chg="mod">
+          <ac:chgData name="张 智" userId="36bdf691fd3510be" providerId="LiveId" clId="{4ACBCBA1-ED6D-491C-9148-AF0EE5CDBC60}" dt="2024-10-15T03:40:45.230" v="241" actId="20577"/>
+          <ac:spMkLst>
+            <pc:docMk/>
+            <pc:sldMk cId="318857117" sldId="1615"/>
+            <ac:spMk id="5" creationId="{62A00533-6CA6-4852-9D17-206B9E793CEC}"/>
+          </ac:spMkLst>
+        </pc:spChg>
+      </pc:sldChg>
+    </pc:docChg>
+  </pc:docChgLst>
+  <pc:docChgLst>
     <pc:chgData name="张 智" userId="36bdf691fd3510be" providerId="LiveId" clId="{3514EE7C-60DF-4A81-8797-7118CE9C8E66}"/>
     <pc:docChg chg="undo redo custSel addSld delSld modSld sldOrd">
       <pc:chgData name="张 智" userId="36bdf691fd3510be" providerId="LiveId" clId="{3514EE7C-60DF-4A81-8797-7118CE9C8E66}" dt="2023-10-17T06:56:57.991" v="15854" actId="20577"/>
@@ -12476,7 +12685,23 @@
           <a:bodyPr/>
           <a:lstStyle/>
           <a:p>
-            <a:pPr algn="l"/>
+            <a:pPr marL="0" marR="0" lvl="0" indent="0" algn="l" defTabSz="914400" rtl="0" eaLnBrk="0" fontAlgn="base" latinLnBrk="0" hangingPunct="0">
+              <a:lnSpc>
+                <a:spcPct val="100000"/>
+              </a:lnSpc>
+              <a:spcBef>
+                <a:spcPct val="30000"/>
+              </a:spcBef>
+              <a:spcAft>
+                <a:spcPct val="0"/>
+              </a:spcAft>
+              <a:buClrTx/>
+              <a:buSzTx/>
+              <a:buFontTx/>
+              <a:buNone/>
+              <a:tabLst/>
+              <a:defRPr/>
+            </a:pPr>
             <a:endParaRPr lang="en-US" dirty="0"/>
           </a:p>
         </p:txBody>
@@ -29426,7 +29651,7 @@
             </a:pPr>
             <a:r>
               <a:rPr lang="en-US" sz="2400" dirty="0"/>
-              <a:t>layers: the number of layers and the type of each layer, e.g., convolutional </a:t>
+              <a:t>layers: the number of layers, the layer sequence and the type of each layer, e.g., convolutional </a:t>
             </a:r>
             <a:r>
               <a:rPr lang="en-AU" sz="2400" dirty="0"/>
@@ -32631,7 +32856,7 @@
                 </a:solidFill>
                 <a:latin typeface="Calibri"/>
               </a:rPr>
-              <a:t>Part 1. Suppose the public IPv4 address has a CIDR notation of 212.114.20.0/24, this specifies the subnet where the IPv4 address resides. How many IPv4 addresses does this subnet have? Justify your answer.</a:t>
+              <a:t>Part 1. Suppose a public IPv4 address has a CIDR notation of 212.114.20.0/24, this specifies the subnet where the IPv4 address resides. How many IPv4 addresses does this subnet have? Justify your answer.</a:t>
             </a:r>
           </a:p>
           <a:p>
@@ -33305,7 +33530,7 @@
                 </a:solidFill>
                 <a:latin typeface="Calibri"/>
               </a:rPr>
-              <a:t>Q2: Security and IAM</a:t>
+              <a:t>Q2: IAM</a:t>
             </a:r>
           </a:p>
           <a:p>
@@ -33698,7 +33923,7 @@
                 </a:solidFill>
                 <a:latin typeface="Calibri"/>
               </a:rPr>
-              <a:t>Q2: Security and IAM</a:t>
+              <a:t>Q2: IAM</a:t>
             </a:r>
           </a:p>
           <a:p>
@@ -33938,7 +34163,7 @@
                 </a:solidFill>
                 <a:latin typeface="Calibri"/>
               </a:rPr>
-              <a:t>Q2: Security and IAM</a:t>
+              <a:t>Q2: IAM</a:t>
             </a:r>
           </a:p>
           <a:p>
@@ -34154,7 +34379,7 @@
                 </a:solidFill>
                 <a:latin typeface="Calibri"/>
               </a:rPr>
-              <a:t>Q2: Security and IAM</a:t>
+              <a:t>Q2: IAM</a:t>
             </a:r>
           </a:p>
           <a:p>
@@ -34352,7 +34577,7 @@
                 </a:solidFill>
                 <a:latin typeface="Calibri"/>
               </a:rPr>
-              <a:t>Q2: Security and IAM</a:t>
+              <a:t>Q2: IAM</a:t>
             </a:r>
           </a:p>
         </p:txBody>
@@ -35356,7 +35581,7 @@
                 </a:solidFill>
                 <a:latin typeface="Calibri"/>
               </a:rPr>
-              <a:t>Question 4 IAM, Django and DynamoDB</a:t>
+              <a:t>Question 4 IAM and DynamoDB</a:t>
             </a:r>
           </a:p>
           <a:p>
@@ -35472,7 +35697,7 @@
                 </a:solidFill>
                 <a:latin typeface="Calibri"/>
               </a:rPr>
-              <a:t>Question 4 IAM, Django and DynamoDB</a:t>
+              <a:t>Question 4 IAM and DynamoDB</a:t>
             </a:r>
           </a:p>
           <a:p>
@@ -35670,25 +35895,7 @@
                 </a:solidFill>
                 <a:latin typeface="Calibri"/>
               </a:rPr>
-              <a:t>Question </a:t>
-            </a:r>
-            <a:r>
-              <a:rPr lang="en-US" sz="1800" spc="-1">
-                <a:solidFill>
-                  <a:srgbClr val="000000"/>
-                </a:solidFill>
-                <a:latin typeface="Calibri"/>
-              </a:rPr>
-              <a:t>4 IAM, Django </a:t>
-            </a:r>
-            <a:r>
-              <a:rPr lang="en-US" sz="1800" spc="-1" dirty="0">
-                <a:solidFill>
-                  <a:srgbClr val="000000"/>
-                </a:solidFill>
-                <a:latin typeface="Calibri"/>
-              </a:rPr>
-              <a:t>and DynamoDB</a:t>
+              <a:t>Question 4 IAM and DynamoDB</a:t>
             </a:r>
           </a:p>
           <a:p>
@@ -36101,7 +36308,25 @@
                 </a:solidFill>
                 <a:latin typeface="Calibri"/>
               </a:rPr>
-              <a:t>Question 4 Django and DynamoDB</a:t>
+              <a:t>Question </a:t>
+            </a:r>
+            <a:r>
+              <a:rPr lang="en-US" sz="1800" spc="-1">
+                <a:solidFill>
+                  <a:srgbClr val="000000"/>
+                </a:solidFill>
+                <a:latin typeface="Calibri"/>
+              </a:rPr>
+              <a:t>4 IAM </a:t>
+            </a:r>
+            <a:r>
+              <a:rPr lang="en-US" sz="1800" spc="-1" dirty="0">
+                <a:solidFill>
+                  <a:srgbClr val="000000"/>
+                </a:solidFill>
+                <a:latin typeface="Calibri"/>
+              </a:rPr>
+              <a:t>and DynamoDB</a:t>
             </a:r>
           </a:p>
           <a:p>

</xml_diff>